<commit_message>
Plotting updates for revision
</commit_message>
<xml_diff>
--- a/figures/Photoreactor_setup.pptx
+++ b/figures/Photoreactor_setup.pptx
@@ -243,7 +243,7 @@
           <a:p>
             <a:fld id="{60D49644-9197-495D-AD14-F85B00396347}" type="datetimeFigureOut">
               <a:rPr lang="de-DE" smtClean="0"/>
-              <a:t>28.11.25</a:t>
+              <a:t>07.01.26</a:t>
             </a:fld>
             <a:endParaRPr lang="de-DE"/>
           </a:p>
@@ -413,7 +413,7 @@
           <a:p>
             <a:fld id="{60D49644-9197-495D-AD14-F85B00396347}" type="datetimeFigureOut">
               <a:rPr lang="de-DE" smtClean="0"/>
-              <a:t>28.11.25</a:t>
+              <a:t>07.01.26</a:t>
             </a:fld>
             <a:endParaRPr lang="de-DE"/>
           </a:p>
@@ -593,7 +593,7 @@
           <a:p>
             <a:fld id="{60D49644-9197-495D-AD14-F85B00396347}" type="datetimeFigureOut">
               <a:rPr lang="de-DE" smtClean="0"/>
-              <a:t>28.11.25</a:t>
+              <a:t>07.01.26</a:t>
             </a:fld>
             <a:endParaRPr lang="de-DE"/>
           </a:p>
@@ -763,7 +763,7 @@
           <a:p>
             <a:fld id="{60D49644-9197-495D-AD14-F85B00396347}" type="datetimeFigureOut">
               <a:rPr lang="de-DE" smtClean="0"/>
-              <a:t>28.11.25</a:t>
+              <a:t>07.01.26</a:t>
             </a:fld>
             <a:endParaRPr lang="de-DE"/>
           </a:p>
@@ -1007,7 +1007,7 @@
           <a:p>
             <a:fld id="{60D49644-9197-495D-AD14-F85B00396347}" type="datetimeFigureOut">
               <a:rPr lang="de-DE" smtClean="0"/>
-              <a:t>28.11.25</a:t>
+              <a:t>07.01.26</a:t>
             </a:fld>
             <a:endParaRPr lang="de-DE"/>
           </a:p>
@@ -1239,7 +1239,7 @@
           <a:p>
             <a:fld id="{60D49644-9197-495D-AD14-F85B00396347}" type="datetimeFigureOut">
               <a:rPr lang="de-DE" smtClean="0"/>
-              <a:t>28.11.25</a:t>
+              <a:t>07.01.26</a:t>
             </a:fld>
             <a:endParaRPr lang="de-DE"/>
           </a:p>
@@ -1606,7 +1606,7 @@
           <a:p>
             <a:fld id="{60D49644-9197-495D-AD14-F85B00396347}" type="datetimeFigureOut">
               <a:rPr lang="de-DE" smtClean="0"/>
-              <a:t>28.11.25</a:t>
+              <a:t>07.01.26</a:t>
             </a:fld>
             <a:endParaRPr lang="de-DE"/>
           </a:p>
@@ -1724,7 +1724,7 @@
           <a:p>
             <a:fld id="{60D49644-9197-495D-AD14-F85B00396347}" type="datetimeFigureOut">
               <a:rPr lang="de-DE" smtClean="0"/>
-              <a:t>28.11.25</a:t>
+              <a:t>07.01.26</a:t>
             </a:fld>
             <a:endParaRPr lang="de-DE"/>
           </a:p>
@@ -1819,7 +1819,7 @@
           <a:p>
             <a:fld id="{60D49644-9197-495D-AD14-F85B00396347}" type="datetimeFigureOut">
               <a:rPr lang="de-DE" smtClean="0"/>
-              <a:t>28.11.25</a:t>
+              <a:t>07.01.26</a:t>
             </a:fld>
             <a:endParaRPr lang="de-DE"/>
           </a:p>
@@ -2096,7 +2096,7 @@
           <a:p>
             <a:fld id="{60D49644-9197-495D-AD14-F85B00396347}" type="datetimeFigureOut">
               <a:rPr lang="de-DE" smtClean="0"/>
-              <a:t>28.11.25</a:t>
+              <a:t>07.01.26</a:t>
             </a:fld>
             <a:endParaRPr lang="de-DE"/>
           </a:p>
@@ -2353,7 +2353,7 @@
           <a:p>
             <a:fld id="{60D49644-9197-495D-AD14-F85B00396347}" type="datetimeFigureOut">
               <a:rPr lang="de-DE" smtClean="0"/>
-              <a:t>28.11.25</a:t>
+              <a:t>07.01.26</a:t>
             </a:fld>
             <a:endParaRPr lang="de-DE"/>
           </a:p>
@@ -2566,7 +2566,7 @@
           <a:p>
             <a:fld id="{60D49644-9197-495D-AD14-F85B00396347}" type="datetimeFigureOut">
               <a:rPr lang="de-DE" smtClean="0"/>
-              <a:t>28.11.25</a:t>
+              <a:t>07.01.26</a:t>
             </a:fld>
             <a:endParaRPr lang="de-DE"/>
           </a:p>
@@ -10569,7 +10569,7 @@
         <p:spPr>
           <a:xfrm>
             <a:off x="135468" y="-101601"/>
-            <a:ext cx="1018227" cy="1477328"/>
+            <a:ext cx="740908" cy="1015663"/>
           </a:xfrm>
           <a:prstGeom prst="rect">
             <a:avLst/>
@@ -10583,7 +10583,7 @@
           <a:lstStyle/>
           <a:p>
             <a:r>
-              <a:rPr lang="en-DE" sz="9000" b="1" dirty="0">
+              <a:rPr lang="en-DE" sz="6000" b="1" dirty="0">
                 <a:latin typeface="Arial" panose="020B0604020202020204" pitchFamily="34" charset="0"/>
                 <a:cs typeface="Arial" panose="020B0604020202020204" pitchFamily="34" charset="0"/>
               </a:rPr>
@@ -10607,7 +10607,7 @@
         <p:spPr>
           <a:xfrm>
             <a:off x="16121880" y="-33867"/>
-            <a:ext cx="1018227" cy="1477328"/>
+            <a:ext cx="740908" cy="1015663"/>
           </a:xfrm>
           <a:prstGeom prst="rect">
             <a:avLst/>
@@ -10621,7 +10621,7 @@
           <a:lstStyle/>
           <a:p>
             <a:r>
-              <a:rPr lang="en-DE" sz="9000" b="1" dirty="0">
+              <a:rPr lang="en-DE" sz="6000" b="1" dirty="0">
                 <a:latin typeface="Arial" panose="020B0604020202020204" pitchFamily="34" charset="0"/>
                 <a:cs typeface="Arial" panose="020B0604020202020204" pitchFamily="34" charset="0"/>
               </a:rPr>

</xml_diff>